<commit_message>
Update to CTF v1.5 open source release
</commit_message>
<xml_diff>
--- a/docs/masters/CTF_Figures.pptx
+++ b/docs/masters/CTF_Figures.pptx
@@ -201,7 +201,7 @@
           <a:p>
             <a:fld id="{4DBD3FD7-B303-4087-A1A5-FAED1CF1DE59}" type="datetimeFigureOut">
               <a:rPr lang="en-US" smtClean="0"/>
-              <a:t>9/13/2021</a:t>
+              <a:t>3/23/2022</a:t>
             </a:fld>
             <a:endParaRPr lang="en-US"/>
           </a:p>
@@ -699,7 +699,7 @@
           <a:p>
             <a:fld id="{ADF00921-49DC-4C8B-988C-B34B893E10C3}" type="datetimeFigureOut">
               <a:rPr lang="en-US" smtClean="0"/>
-              <a:t>9/13/2021</a:t>
+              <a:t>3/23/2022</a:t>
             </a:fld>
             <a:endParaRPr lang="en-US"/>
           </a:p>
@@ -897,7 +897,7 @@
           <a:p>
             <a:fld id="{ADF00921-49DC-4C8B-988C-B34B893E10C3}" type="datetimeFigureOut">
               <a:rPr lang="en-US" smtClean="0"/>
-              <a:t>9/13/2021</a:t>
+              <a:t>3/23/2022</a:t>
             </a:fld>
             <a:endParaRPr lang="en-US"/>
           </a:p>
@@ -1105,7 +1105,7 @@
           <a:p>
             <a:fld id="{ADF00921-49DC-4C8B-988C-B34B893E10C3}" type="datetimeFigureOut">
               <a:rPr lang="en-US" smtClean="0"/>
-              <a:t>9/13/2021</a:t>
+              <a:t>3/23/2022</a:t>
             </a:fld>
             <a:endParaRPr lang="en-US"/>
           </a:p>
@@ -1303,7 +1303,7 @@
           <a:p>
             <a:fld id="{ADF00921-49DC-4C8B-988C-B34B893E10C3}" type="datetimeFigureOut">
               <a:rPr lang="en-US" smtClean="0"/>
-              <a:t>9/13/2021</a:t>
+              <a:t>3/23/2022</a:t>
             </a:fld>
             <a:endParaRPr lang="en-US"/>
           </a:p>
@@ -1578,7 +1578,7 @@
           <a:p>
             <a:fld id="{ADF00921-49DC-4C8B-988C-B34B893E10C3}" type="datetimeFigureOut">
               <a:rPr lang="en-US" smtClean="0"/>
-              <a:t>9/13/2021</a:t>
+              <a:t>3/23/2022</a:t>
             </a:fld>
             <a:endParaRPr lang="en-US"/>
           </a:p>
@@ -1843,7 +1843,7 @@
           <a:p>
             <a:fld id="{ADF00921-49DC-4C8B-988C-B34B893E10C3}" type="datetimeFigureOut">
               <a:rPr lang="en-US" smtClean="0"/>
-              <a:t>9/13/2021</a:t>
+              <a:t>3/23/2022</a:t>
             </a:fld>
             <a:endParaRPr lang="en-US"/>
           </a:p>
@@ -2255,7 +2255,7 @@
           <a:p>
             <a:fld id="{ADF00921-49DC-4C8B-988C-B34B893E10C3}" type="datetimeFigureOut">
               <a:rPr lang="en-US" smtClean="0"/>
-              <a:t>9/13/2021</a:t>
+              <a:t>3/23/2022</a:t>
             </a:fld>
             <a:endParaRPr lang="en-US"/>
           </a:p>
@@ -2396,7 +2396,7 @@
           <a:p>
             <a:fld id="{ADF00921-49DC-4C8B-988C-B34B893E10C3}" type="datetimeFigureOut">
               <a:rPr lang="en-US" smtClean="0"/>
-              <a:t>9/13/2021</a:t>
+              <a:t>3/23/2022</a:t>
             </a:fld>
             <a:endParaRPr lang="en-US"/>
           </a:p>
@@ -2509,7 +2509,7 @@
           <a:p>
             <a:fld id="{ADF00921-49DC-4C8B-988C-B34B893E10C3}" type="datetimeFigureOut">
               <a:rPr lang="en-US" smtClean="0"/>
-              <a:t>9/13/2021</a:t>
+              <a:t>3/23/2022</a:t>
             </a:fld>
             <a:endParaRPr lang="en-US"/>
           </a:p>
@@ -2820,7 +2820,7 @@
           <a:p>
             <a:fld id="{ADF00921-49DC-4C8B-988C-B34B893E10C3}" type="datetimeFigureOut">
               <a:rPr lang="en-US" smtClean="0"/>
-              <a:t>9/13/2021</a:t>
+              <a:t>3/23/2022</a:t>
             </a:fld>
             <a:endParaRPr lang="en-US"/>
           </a:p>
@@ -3108,7 +3108,7 @@
           <a:p>
             <a:fld id="{ADF00921-49DC-4C8B-988C-B34B893E10C3}" type="datetimeFigureOut">
               <a:rPr lang="en-US" smtClean="0"/>
-              <a:t>9/13/2021</a:t>
+              <a:t>3/23/2022</a:t>
             </a:fld>
             <a:endParaRPr lang="en-US"/>
           </a:p>
@@ -3349,7 +3349,7 @@
           <a:p>
             <a:fld id="{ADF00921-49DC-4C8B-988C-B34B893E10C3}" type="datetimeFigureOut">
               <a:rPr lang="en-US" smtClean="0"/>
-              <a:t>9/13/2021</a:t>
+              <a:t>3/23/2022</a:t>
             </a:fld>
             <a:endParaRPr lang="en-US"/>
           </a:p>
@@ -3780,8 +3780,8 @@
         </p:nvGrpSpPr>
         <p:grpSpPr>
           <a:xfrm>
-            <a:off x="679207" y="535530"/>
-            <a:ext cx="6702669" cy="4006604"/>
+            <a:off x="679207" y="535529"/>
+            <a:ext cx="7088754" cy="4489231"/>
             <a:chOff x="679207" y="535530"/>
             <a:chExt cx="6702669" cy="4006604"/>
           </a:xfrm>
@@ -3803,7 +3803,7 @@
           <p:spPr>
             <a:xfrm>
               <a:off x="679207" y="547097"/>
-              <a:ext cx="2617658" cy="2925085"/>
+              <a:ext cx="2617658" cy="2604931"/>
             </a:xfrm>
             <a:prstGeom prst="rect">
               <a:avLst/>
@@ -4653,7 +4653,7 @@
           <p:spPr>
             <a:xfrm>
               <a:off x="3369157" y="537572"/>
-              <a:ext cx="1835393" cy="3084058"/>
+              <a:ext cx="1835393" cy="3188467"/>
             </a:xfrm>
             <a:prstGeom prst="rect">
               <a:avLst/>
@@ -4847,6 +4847,18 @@
                 <a:rPr lang="en-US" sz="1200" b="1" i="1" dirty="0"/>
                 <a:t>Core</a:t>
               </a:r>
+            </a:p>
+            <a:p>
+              <a:pPr marL="0" indent="0">
+                <a:lnSpc>
+                  <a:spcPct val="100000"/>
+                </a:lnSpc>
+                <a:spcBef>
+                  <a:spcPts val="0"/>
+                </a:spcBef>
+                <a:buNone/>
+              </a:pPr>
+              <a:endParaRPr lang="en-US" sz="1200" b="1" i="1" dirty="0"/>
             </a:p>
             <a:p>
               <a:pPr marL="0" indent="0">
@@ -5523,6 +5535,17 @@
                 <a:rPr lang="en-US" sz="1200" b="1" i="1" dirty="0"/>
                 <a:t>CFS Plugin</a:t>
               </a:r>
+            </a:p>
+            <a:p>
+              <a:pPr algn="l">
+                <a:lnSpc>
+                  <a:spcPct val="100000"/>
+                </a:lnSpc>
+                <a:spcBef>
+                  <a:spcPts val="0"/>
+                </a:spcBef>
+              </a:pPr>
+              <a:endParaRPr lang="en-US" sz="1200" b="1" i="1" dirty="0"/>
             </a:p>
             <a:p>
               <a:pPr algn="l">
@@ -6251,6 +6274,264 @@
           </p:txBody>
         </p:sp>
       </p:grpSp>
+      <p:sp>
+        <p:nvSpPr>
+          <p:cNvPr id="12" name="Subtitle 2">
+            <a:extLst>
+              <a:ext uri="{FF2B5EF4-FFF2-40B4-BE49-F238E27FC236}">
+                <a16:creationId xmlns:a16="http://schemas.microsoft.com/office/drawing/2014/main" id="{2B2DD354-8828-4964-BF39-8AE40DDB884D}"/>
+              </a:ext>
+            </a:extLst>
+          </p:cNvPr>
+          <p:cNvSpPr txBox="1">
+            <a:spLocks/>
+          </p:cNvSpPr>
+          <p:nvPr/>
+        </p:nvSpPr>
+        <p:spPr>
+          <a:xfrm>
+            <a:off x="680681" y="3536436"/>
+            <a:ext cx="2454871" cy="717440"/>
+          </a:xfrm>
+          <a:prstGeom prst="rect">
+            <a:avLst/>
+          </a:prstGeom>
+          <a:solidFill>
+            <a:schemeClr val="accent5">
+              <a:lumMod val="40000"/>
+              <a:lumOff val="60000"/>
+            </a:schemeClr>
+          </a:solidFill>
+        </p:spPr>
+        <p:txBody>
+          <a:bodyPr vert="horz" lIns="91440" tIns="45720" rIns="91440" bIns="45720" rtlCol="0">
+            <a:noAutofit/>
+          </a:bodyPr>
+          <a:lstStyle>
+            <a:lvl1pPr marL="0" indent="0" algn="ctr" defTabSz="914400" rtl="0" eaLnBrk="1" latinLnBrk="0" hangingPunct="1">
+              <a:lnSpc>
+                <a:spcPct val="90000"/>
+              </a:lnSpc>
+              <a:spcBef>
+                <a:spcPts val="1000"/>
+              </a:spcBef>
+              <a:buFont typeface="Arial" panose="020B0604020202020204" pitchFamily="34" charset="0"/>
+              <a:buNone/>
+              <a:defRPr sz="2400" kern="1200">
+                <a:solidFill>
+                  <a:schemeClr val="tx1"/>
+                </a:solidFill>
+                <a:latin typeface="+mn-lt"/>
+                <a:ea typeface="+mn-ea"/>
+                <a:cs typeface="+mn-cs"/>
+              </a:defRPr>
+            </a:lvl1pPr>
+            <a:lvl2pPr marL="457200" indent="0" algn="ctr" defTabSz="914400" rtl="0" eaLnBrk="1" latinLnBrk="0" hangingPunct="1">
+              <a:lnSpc>
+                <a:spcPct val="90000"/>
+              </a:lnSpc>
+              <a:spcBef>
+                <a:spcPts val="500"/>
+              </a:spcBef>
+              <a:buFont typeface="Arial" panose="020B0604020202020204" pitchFamily="34" charset="0"/>
+              <a:buNone/>
+              <a:defRPr sz="2000" kern="1200">
+                <a:solidFill>
+                  <a:schemeClr val="tx1"/>
+                </a:solidFill>
+                <a:latin typeface="+mn-lt"/>
+                <a:ea typeface="+mn-ea"/>
+                <a:cs typeface="+mn-cs"/>
+              </a:defRPr>
+            </a:lvl2pPr>
+            <a:lvl3pPr marL="914400" indent="0" algn="ctr" defTabSz="914400" rtl="0" eaLnBrk="1" latinLnBrk="0" hangingPunct="1">
+              <a:lnSpc>
+                <a:spcPct val="90000"/>
+              </a:lnSpc>
+              <a:spcBef>
+                <a:spcPts val="500"/>
+              </a:spcBef>
+              <a:buFont typeface="Arial" panose="020B0604020202020204" pitchFamily="34" charset="0"/>
+              <a:buNone/>
+              <a:defRPr sz="1800" kern="1200">
+                <a:solidFill>
+                  <a:schemeClr val="tx1"/>
+                </a:solidFill>
+                <a:latin typeface="+mn-lt"/>
+                <a:ea typeface="+mn-ea"/>
+                <a:cs typeface="+mn-cs"/>
+              </a:defRPr>
+            </a:lvl3pPr>
+            <a:lvl4pPr marL="1371600" indent="0" algn="ctr" defTabSz="914400" rtl="0" eaLnBrk="1" latinLnBrk="0" hangingPunct="1">
+              <a:lnSpc>
+                <a:spcPct val="90000"/>
+              </a:lnSpc>
+              <a:spcBef>
+                <a:spcPts val="500"/>
+              </a:spcBef>
+              <a:buFont typeface="Arial" panose="020B0604020202020204" pitchFamily="34" charset="0"/>
+              <a:buNone/>
+              <a:defRPr sz="1600" kern="1200">
+                <a:solidFill>
+                  <a:schemeClr val="tx1"/>
+                </a:solidFill>
+                <a:latin typeface="+mn-lt"/>
+                <a:ea typeface="+mn-ea"/>
+                <a:cs typeface="+mn-cs"/>
+              </a:defRPr>
+            </a:lvl4pPr>
+            <a:lvl5pPr marL="1828800" indent="0" algn="ctr" defTabSz="914400" rtl="0" eaLnBrk="1" latinLnBrk="0" hangingPunct="1">
+              <a:lnSpc>
+                <a:spcPct val="90000"/>
+              </a:lnSpc>
+              <a:spcBef>
+                <a:spcPts val="500"/>
+              </a:spcBef>
+              <a:buFont typeface="Arial" panose="020B0604020202020204" pitchFamily="34" charset="0"/>
+              <a:buNone/>
+              <a:defRPr sz="1600" kern="1200">
+                <a:solidFill>
+                  <a:schemeClr val="tx1"/>
+                </a:solidFill>
+                <a:latin typeface="+mn-lt"/>
+                <a:ea typeface="+mn-ea"/>
+                <a:cs typeface="+mn-cs"/>
+              </a:defRPr>
+            </a:lvl5pPr>
+            <a:lvl6pPr marL="2286000" indent="0" algn="ctr" defTabSz="914400" rtl="0" eaLnBrk="1" latinLnBrk="0" hangingPunct="1">
+              <a:lnSpc>
+                <a:spcPct val="90000"/>
+              </a:lnSpc>
+              <a:spcBef>
+                <a:spcPts val="500"/>
+              </a:spcBef>
+              <a:buFont typeface="Arial" panose="020B0604020202020204" pitchFamily="34" charset="0"/>
+              <a:buNone/>
+              <a:defRPr sz="1600" kern="1200">
+                <a:solidFill>
+                  <a:schemeClr val="tx1"/>
+                </a:solidFill>
+                <a:latin typeface="+mn-lt"/>
+                <a:ea typeface="+mn-ea"/>
+                <a:cs typeface="+mn-cs"/>
+              </a:defRPr>
+            </a:lvl6pPr>
+            <a:lvl7pPr marL="2743200" indent="0" algn="ctr" defTabSz="914400" rtl="0" eaLnBrk="1" latinLnBrk="0" hangingPunct="1">
+              <a:lnSpc>
+                <a:spcPct val="90000"/>
+              </a:lnSpc>
+              <a:spcBef>
+                <a:spcPts val="500"/>
+              </a:spcBef>
+              <a:buFont typeface="Arial" panose="020B0604020202020204" pitchFamily="34" charset="0"/>
+              <a:buNone/>
+              <a:defRPr sz="1600" kern="1200">
+                <a:solidFill>
+                  <a:schemeClr val="tx1"/>
+                </a:solidFill>
+                <a:latin typeface="+mn-lt"/>
+                <a:ea typeface="+mn-ea"/>
+                <a:cs typeface="+mn-cs"/>
+              </a:defRPr>
+            </a:lvl7pPr>
+            <a:lvl8pPr marL="3200400" indent="0" algn="ctr" defTabSz="914400" rtl="0" eaLnBrk="1" latinLnBrk="0" hangingPunct="1">
+              <a:lnSpc>
+                <a:spcPct val="90000"/>
+              </a:lnSpc>
+              <a:spcBef>
+                <a:spcPts val="500"/>
+              </a:spcBef>
+              <a:buFont typeface="Arial" panose="020B0604020202020204" pitchFamily="34" charset="0"/>
+              <a:buNone/>
+              <a:defRPr sz="1600" kern="1200">
+                <a:solidFill>
+                  <a:schemeClr val="tx1"/>
+                </a:solidFill>
+                <a:latin typeface="+mn-lt"/>
+                <a:ea typeface="+mn-ea"/>
+                <a:cs typeface="+mn-cs"/>
+              </a:defRPr>
+            </a:lvl8pPr>
+            <a:lvl9pPr marL="3657600" indent="0" algn="ctr" defTabSz="914400" rtl="0" eaLnBrk="1" latinLnBrk="0" hangingPunct="1">
+              <a:lnSpc>
+                <a:spcPct val="90000"/>
+              </a:lnSpc>
+              <a:spcBef>
+                <a:spcPts val="500"/>
+              </a:spcBef>
+              <a:buFont typeface="Arial" panose="020B0604020202020204" pitchFamily="34" charset="0"/>
+              <a:buNone/>
+              <a:defRPr sz="1600" kern="1200">
+                <a:solidFill>
+                  <a:schemeClr val="tx1"/>
+                </a:solidFill>
+                <a:latin typeface="+mn-lt"/>
+                <a:ea typeface="+mn-ea"/>
+                <a:cs typeface="+mn-cs"/>
+              </a:defRPr>
+            </a:lvl9pPr>
+          </a:lstStyle>
+          <a:p>
+            <a:pPr algn="l">
+              <a:lnSpc>
+                <a:spcPct val="100000"/>
+              </a:lnSpc>
+              <a:spcBef>
+                <a:spcPts val="0"/>
+              </a:spcBef>
+            </a:pPr>
+            <a:r>
+              <a:rPr lang="en-US" sz="1200" b="1" i="1" dirty="0">
+                <a:cs typeface="Times New Roman" panose="02020603050405020304" pitchFamily="18" charset="0"/>
+              </a:rPr>
+              <a:t>Validation Plugin</a:t>
+            </a:r>
+          </a:p>
+          <a:p>
+            <a:pPr algn="l">
+              <a:lnSpc>
+                <a:spcPct val="100000"/>
+              </a:lnSpc>
+              <a:spcBef>
+                <a:spcPts val="0"/>
+              </a:spcBef>
+            </a:pPr>
+            <a:r>
+              <a:rPr lang="en-US" sz="1200" dirty="0">
+                <a:cs typeface="Times New Roman" panose="02020603050405020304" pitchFamily="18" charset="0"/>
+              </a:rPr>
+              <a:t>ctf/plugins/</a:t>
+            </a:r>
+            <a:r>
+              <a:rPr lang="en-US" sz="1200" dirty="0" err="1">
+                <a:cs typeface="Times New Roman" panose="02020603050405020304" pitchFamily="18" charset="0"/>
+              </a:rPr>
+              <a:t>validation_plugin</a:t>
+            </a:r>
+            <a:endParaRPr lang="en-US" sz="1200" dirty="0">
+              <a:cs typeface="Times New Roman" panose="02020603050405020304" pitchFamily="18" charset="0"/>
+            </a:endParaRPr>
+          </a:p>
+          <a:p>
+            <a:pPr marL="285750" indent="-171450" algn="l">
+              <a:lnSpc>
+                <a:spcPct val="100000"/>
+              </a:lnSpc>
+              <a:spcBef>
+                <a:spcPts val="0"/>
+              </a:spcBef>
+              <a:buFont typeface="Arial" panose="020B0604020202020204" pitchFamily="34" charset="0"/>
+              <a:buChar char="•"/>
+            </a:pPr>
+            <a:r>
+              <a:rPr lang="en-US" sz="1200" dirty="0">
+                <a:cs typeface="Times New Roman" panose="02020603050405020304" pitchFamily="18" charset="0"/>
+              </a:rPr>
+              <a:t>validation_plugin.py</a:t>
+            </a:r>
+          </a:p>
+        </p:txBody>
+      </p:sp>
     </p:spTree>
     <p:extLst>
       <p:ext uri="{BB962C8B-B14F-4D97-AF65-F5344CB8AC3E}">

</xml_diff>